<commit_message>
update to unsupervised ML methodology
</commit_message>
<xml_diff>
--- a/Assignment_Help/Methodology/Methodology_Crypto.pptx
+++ b/Assignment_Help/Methodology/Methodology_Crypto.pptx
@@ -259,7 +259,7 @@
           <a:p>
             <a:fld id="{5BE6CE55-6920-45C7-8C02-6CAE914E836E}" type="datetimeFigureOut">
               <a:rPr lang="en-US" smtClean="0"/>
-              <a:t>2/28/2022</a:t>
+              <a:t>3/1/2022</a:t>
             </a:fld>
             <a:endParaRPr lang="en-US"/>
           </a:p>
@@ -457,7 +457,7 @@
           <a:p>
             <a:fld id="{5BE6CE55-6920-45C7-8C02-6CAE914E836E}" type="datetimeFigureOut">
               <a:rPr lang="en-US" smtClean="0"/>
-              <a:t>2/28/2022</a:t>
+              <a:t>3/1/2022</a:t>
             </a:fld>
             <a:endParaRPr lang="en-US"/>
           </a:p>
@@ -665,7 +665,7 @@
           <a:p>
             <a:fld id="{5BE6CE55-6920-45C7-8C02-6CAE914E836E}" type="datetimeFigureOut">
               <a:rPr lang="en-US" smtClean="0"/>
-              <a:t>2/28/2022</a:t>
+              <a:t>3/1/2022</a:t>
             </a:fld>
             <a:endParaRPr lang="en-US"/>
           </a:p>
@@ -863,7 +863,7 @@
           <a:p>
             <a:fld id="{5BE6CE55-6920-45C7-8C02-6CAE914E836E}" type="datetimeFigureOut">
               <a:rPr lang="en-US" smtClean="0"/>
-              <a:t>2/28/2022</a:t>
+              <a:t>3/1/2022</a:t>
             </a:fld>
             <a:endParaRPr lang="en-US"/>
           </a:p>
@@ -1138,7 +1138,7 @@
           <a:p>
             <a:fld id="{5BE6CE55-6920-45C7-8C02-6CAE914E836E}" type="datetimeFigureOut">
               <a:rPr lang="en-US" smtClean="0"/>
-              <a:t>2/28/2022</a:t>
+              <a:t>3/1/2022</a:t>
             </a:fld>
             <a:endParaRPr lang="en-US"/>
           </a:p>
@@ -1403,7 +1403,7 @@
           <a:p>
             <a:fld id="{5BE6CE55-6920-45C7-8C02-6CAE914E836E}" type="datetimeFigureOut">
               <a:rPr lang="en-US" smtClean="0"/>
-              <a:t>2/28/2022</a:t>
+              <a:t>3/1/2022</a:t>
             </a:fld>
             <a:endParaRPr lang="en-US"/>
           </a:p>
@@ -1815,7 +1815,7 @@
           <a:p>
             <a:fld id="{5BE6CE55-6920-45C7-8C02-6CAE914E836E}" type="datetimeFigureOut">
               <a:rPr lang="en-US" smtClean="0"/>
-              <a:t>2/28/2022</a:t>
+              <a:t>3/1/2022</a:t>
             </a:fld>
             <a:endParaRPr lang="en-US"/>
           </a:p>
@@ -1956,7 +1956,7 @@
           <a:p>
             <a:fld id="{5BE6CE55-6920-45C7-8C02-6CAE914E836E}" type="datetimeFigureOut">
               <a:rPr lang="en-US" smtClean="0"/>
-              <a:t>2/28/2022</a:t>
+              <a:t>3/1/2022</a:t>
             </a:fld>
             <a:endParaRPr lang="en-US"/>
           </a:p>
@@ -2069,7 +2069,7 @@
           <a:p>
             <a:fld id="{5BE6CE55-6920-45C7-8C02-6CAE914E836E}" type="datetimeFigureOut">
               <a:rPr lang="en-US" smtClean="0"/>
-              <a:t>2/28/2022</a:t>
+              <a:t>3/1/2022</a:t>
             </a:fld>
             <a:endParaRPr lang="en-US"/>
           </a:p>
@@ -2380,7 +2380,7 @@
           <a:p>
             <a:fld id="{5BE6CE55-6920-45C7-8C02-6CAE914E836E}" type="datetimeFigureOut">
               <a:rPr lang="en-US" smtClean="0"/>
-              <a:t>2/28/2022</a:t>
+              <a:t>3/1/2022</a:t>
             </a:fld>
             <a:endParaRPr lang="en-US"/>
           </a:p>
@@ -2668,7 +2668,7 @@
           <a:p>
             <a:fld id="{5BE6CE55-6920-45C7-8C02-6CAE914E836E}" type="datetimeFigureOut">
               <a:rPr lang="en-US" smtClean="0"/>
-              <a:t>2/28/2022</a:t>
+              <a:t>3/1/2022</a:t>
             </a:fld>
             <a:endParaRPr lang="en-US"/>
           </a:p>
@@ -2909,7 +2909,7 @@
           <a:p>
             <a:fld id="{5BE6CE55-6920-45C7-8C02-6CAE914E836E}" type="datetimeFigureOut">
               <a:rPr lang="en-US" smtClean="0"/>
-              <a:t>2/28/2022</a:t>
+              <a:t>3/1/2022</a:t>
             </a:fld>
             <a:endParaRPr lang="en-US"/>
           </a:p>
@@ -4265,7 +4265,7 @@
         </p:nvGrpSpPr>
         <p:grpSpPr>
           <a:xfrm>
-            <a:off x="6263233" y="2148416"/>
+            <a:off x="6261779" y="2028233"/>
             <a:ext cx="2419972" cy="501318"/>
             <a:chOff x="6263233" y="2148416"/>
             <a:chExt cx="2419972" cy="1057480"/>
@@ -4376,42 +4376,6 @@
           </p:txBody>
         </p:sp>
       </p:grpSp>
-      <p:pic>
-        <p:nvPicPr>
-          <p:cNvPr id="76" name="Picture 75">
-            <a:extLst>
-              <a:ext uri="{FF2B5EF4-FFF2-40B4-BE49-F238E27FC236}">
-                <a16:creationId xmlns:a16="http://schemas.microsoft.com/office/drawing/2014/main" id="{78424B73-0C04-4AA4-90B7-3CBB49D1B182}"/>
-              </a:ext>
-            </a:extLst>
-          </p:cNvPr>
-          <p:cNvPicPr>
-            <a:picLocks noChangeAspect="1"/>
-          </p:cNvPicPr>
-          <p:nvPr/>
-        </p:nvPicPr>
-        <p:blipFill>
-          <a:blip r:embed="rId6">
-            <a:extLst>
-              <a:ext uri="{28A0092B-C50C-407E-A947-70E740481C1C}">
-                <a14:useLocalDpi xmlns:a14="http://schemas.microsoft.com/office/drawing/2010/main" val="0"/>
-              </a:ext>
-            </a:extLst>
-          </a:blip>
-          <a:stretch>
-            <a:fillRect/>
-          </a:stretch>
-        </p:blipFill>
-        <p:spPr>
-          <a:xfrm>
-            <a:off x="8892332" y="534091"/>
-            <a:ext cx="3047119" cy="1158540"/>
-          </a:xfrm>
-          <a:prstGeom prst="rect">
-            <a:avLst/>
-          </a:prstGeom>
-        </p:spPr>
-      </p:pic>
       <p:cxnSp>
         <p:nvCxnSpPr>
           <p:cNvPr id="89" name="Straight Arrow Connector 88">
@@ -4509,7 +4473,7 @@
           <p:nvPr/>
         </p:nvPicPr>
         <p:blipFill rotWithShape="1">
-          <a:blip r:embed="rId7">
+          <a:blip r:embed="rId6">
             <a:extLst>
               <a:ext uri="{28A0092B-C50C-407E-A947-70E740481C1C}">
                 <a14:useLocalDpi xmlns:a14="http://schemas.microsoft.com/office/drawing/2010/main" val="0"/>
@@ -4544,7 +4508,7 @@
           <p:nvPr/>
         </p:nvPicPr>
         <p:blipFill>
-          <a:blip r:embed="rId8">
+          <a:blip r:embed="rId7">
             <a:extLst>
               <a:ext uri="{28A0092B-C50C-407E-A947-70E740481C1C}">
                 <a14:useLocalDpi xmlns:a14="http://schemas.microsoft.com/office/drawing/2010/main" val="0"/>
@@ -4610,47 +4574,6 @@
           </a:p>
         </p:txBody>
       </p:sp>
-      <p:cxnSp>
-        <p:nvCxnSpPr>
-          <p:cNvPr id="105" name="Straight Arrow Connector 104">
-            <a:extLst>
-              <a:ext uri="{FF2B5EF4-FFF2-40B4-BE49-F238E27FC236}">
-                <a16:creationId xmlns:a16="http://schemas.microsoft.com/office/drawing/2014/main" id="{0DD197B4-3386-4A59-8DE8-B2D9A9E8958F}"/>
-              </a:ext>
-            </a:extLst>
-          </p:cNvPr>
-          <p:cNvCxnSpPr>
-            <a:cxnSpLocks/>
-          </p:cNvCxnSpPr>
-          <p:nvPr/>
-        </p:nvCxnSpPr>
-        <p:spPr>
-          <a:xfrm>
-            <a:off x="8334395" y="1152792"/>
-            <a:ext cx="659676" cy="0"/>
-          </a:xfrm>
-          <a:prstGeom prst="straightConnector1">
-            <a:avLst/>
-          </a:prstGeom>
-          <a:ln>
-            <a:tailEnd type="triangle"/>
-          </a:ln>
-        </p:spPr>
-        <p:style>
-          <a:lnRef idx="1">
-            <a:schemeClr val="accent1"/>
-          </a:lnRef>
-          <a:fillRef idx="0">
-            <a:schemeClr val="accent1"/>
-          </a:fillRef>
-          <a:effectRef idx="0">
-            <a:schemeClr val="accent1"/>
-          </a:effectRef>
-          <a:fontRef idx="minor">
-            <a:schemeClr val="tx1"/>
-          </a:fontRef>
-        </p:style>
-      </p:cxnSp>
       <p:cxnSp>
         <p:nvCxnSpPr>
           <p:cNvPr id="106" name="Straight Arrow Connector 105">
@@ -4707,7 +4630,7 @@
           <p:nvPr/>
         </p:nvPicPr>
         <p:blipFill>
-          <a:blip r:embed="rId9">
+          <a:blip r:embed="rId8">
             <a:extLst>
               <a:ext uri="{28A0092B-C50C-407E-A947-70E740481C1C}">
                 <a14:useLocalDpi xmlns:a14="http://schemas.microsoft.com/office/drawing/2010/main" val="0"/>
@@ -4924,127 +4847,105 @@
           </a:p>
         </p:txBody>
       </p:sp>
-      <p:sp>
-        <p:nvSpPr>
-          <p:cNvPr id="121" name="TextBox 120">
-            <a:extLst>
-              <a:ext uri="{FF2B5EF4-FFF2-40B4-BE49-F238E27FC236}">
-                <a16:creationId xmlns:a16="http://schemas.microsoft.com/office/drawing/2014/main" id="{392C8A14-E5AC-440A-B91C-91B9A9EA54EB}"/>
-              </a:ext>
-            </a:extLst>
-          </p:cNvPr>
-          <p:cNvSpPr txBox="1"/>
+      <p:grpSp>
+        <p:nvGrpSpPr>
+          <p:cNvPr id="15" name="Group 14">
+            <a:extLst>
+              <a:ext uri="{FF2B5EF4-FFF2-40B4-BE49-F238E27FC236}">
+                <a16:creationId xmlns:a16="http://schemas.microsoft.com/office/drawing/2014/main" id="{232E5605-7A0E-43FD-A93A-9CE29B0F9414}"/>
+              </a:ext>
+            </a:extLst>
+          </p:cNvPr>
+          <p:cNvGrpSpPr/>
           <p:nvPr/>
-        </p:nvSpPr>
-        <p:spPr>
-          <a:xfrm flipH="1">
-            <a:off x="8779544" y="313425"/>
-            <a:ext cx="1984249" cy="261610"/>
-          </a:xfrm>
-          <a:prstGeom prst="rect">
-            <a:avLst/>
-          </a:prstGeom>
-          <a:noFill/>
-        </p:spPr>
-        <p:txBody>
-          <a:bodyPr wrap="square" rtlCol="0">
-            <a:spAutoFit/>
-          </a:bodyPr>
-          <a:lstStyle/>
-          <a:p>
-            <a:pPr algn="ctr"/>
-            <a:r>
-              <a:rPr lang="en-US" sz="1100" b="1" i="0" dirty="0">
-                <a:solidFill>
-                  <a:srgbClr val="444444"/>
-                </a:solidFill>
-                <a:effectLst/>
-                <a:latin typeface="Lato Extended"/>
-              </a:rPr>
-              <a:t>Combined DataFrame</a:t>
-            </a:r>
-            <a:endParaRPr lang="en-US" sz="1100" b="1" dirty="0"/>
-          </a:p>
-        </p:txBody>
-      </p:sp>
-      <p:pic>
-        <p:nvPicPr>
-          <p:cNvPr id="124" name="Picture 123">
-            <a:extLst>
-              <a:ext uri="{FF2B5EF4-FFF2-40B4-BE49-F238E27FC236}">
-                <a16:creationId xmlns:a16="http://schemas.microsoft.com/office/drawing/2014/main" id="{1AD2F339-3B7A-4B1F-8A66-365180552EC0}"/>
-              </a:ext>
-            </a:extLst>
-          </p:cNvPr>
-          <p:cNvPicPr>
-            <a:picLocks noChangeAspect="1"/>
-          </p:cNvPicPr>
-          <p:nvPr/>
-        </p:nvPicPr>
-        <p:blipFill rotWithShape="1">
-          <a:blip r:embed="rId10">
-            <a:extLst>
-              <a:ext uri="{28A0092B-C50C-407E-A947-70E740481C1C}">
-                <a14:useLocalDpi xmlns:a14="http://schemas.microsoft.com/office/drawing/2010/main" val="0"/>
-              </a:ext>
-            </a:extLst>
-          </a:blip>
-          <a:srcRect l="35062" t="6246" r="34640" b="5296"/>
-          <a:stretch/>
-        </p:blipFill>
-        <p:spPr>
+        </p:nvGrpSpPr>
+        <p:grpSpPr>
           <a:xfrm>
-            <a:off x="6681791" y="439440"/>
-            <a:ext cx="1467429" cy="1628893"/>
-          </a:xfrm>
-          <a:prstGeom prst="rect">
-            <a:avLst/>
-          </a:prstGeom>
-        </p:spPr>
-      </p:pic>
-      <p:sp>
-        <p:nvSpPr>
-          <p:cNvPr id="128" name="TextBox 127">
-            <a:extLst>
-              <a:ext uri="{FF2B5EF4-FFF2-40B4-BE49-F238E27FC236}">
-                <a16:creationId xmlns:a16="http://schemas.microsoft.com/office/drawing/2014/main" id="{BBB56ACB-0B57-4B44-AA08-56AADB5DE5A7}"/>
-              </a:ext>
-            </a:extLst>
-          </p:cNvPr>
-          <p:cNvSpPr txBox="1"/>
-          <p:nvPr/>
-        </p:nvSpPr>
-        <p:spPr>
-          <a:xfrm flipH="1">
-            <a:off x="6386947" y="257059"/>
-            <a:ext cx="1262745" cy="261610"/>
-          </a:xfrm>
-          <a:prstGeom prst="rect">
-            <a:avLst/>
-          </a:prstGeom>
-          <a:noFill/>
-        </p:spPr>
-        <p:txBody>
-          <a:bodyPr wrap="square" rtlCol="0">
-            <a:spAutoFit/>
-          </a:bodyPr>
-          <a:lstStyle/>
-          <a:p>
-            <a:pPr algn="ctr"/>
-            <a:r>
-              <a:rPr lang="en-US" sz="1100" b="1" i="0" dirty="0">
-                <a:solidFill>
-                  <a:srgbClr val="444444"/>
-                </a:solidFill>
-                <a:effectLst/>
-                <a:latin typeface="Lato Extended"/>
-              </a:rPr>
-              <a:t>PCA n=3</a:t>
-            </a:r>
-            <a:endParaRPr lang="en-US" sz="1100" b="1" dirty="0"/>
-          </a:p>
-        </p:txBody>
-      </p:sp>
+            <a:off x="9612855" y="344579"/>
+            <a:ext cx="1801156" cy="1777770"/>
+            <a:chOff x="9360302" y="344579"/>
+            <a:chExt cx="1801156" cy="1777770"/>
+          </a:xfrm>
+        </p:grpSpPr>
+        <p:pic>
+          <p:nvPicPr>
+            <p:cNvPr id="124" name="Picture 123">
+              <a:extLst>
+                <a:ext uri="{FF2B5EF4-FFF2-40B4-BE49-F238E27FC236}">
+                  <a16:creationId xmlns:a16="http://schemas.microsoft.com/office/drawing/2014/main" id="{1AD2F339-3B7A-4B1F-8A66-365180552EC0}"/>
+                </a:ext>
+              </a:extLst>
+            </p:cNvPr>
+            <p:cNvPicPr>
+              <a:picLocks noChangeAspect="1"/>
+            </p:cNvPicPr>
+            <p:nvPr/>
+          </p:nvPicPr>
+          <p:blipFill rotWithShape="1">
+            <a:blip r:embed="rId9">
+              <a:extLst>
+                <a:ext uri="{28A0092B-C50C-407E-A947-70E740481C1C}">
+                  <a14:useLocalDpi xmlns:a14="http://schemas.microsoft.com/office/drawing/2010/main" val="0"/>
+                </a:ext>
+              </a:extLst>
+            </a:blip>
+            <a:srcRect l="35062" t="6246" r="34640" b="5296"/>
+            <a:stretch/>
+          </p:blipFill>
+          <p:spPr>
+            <a:xfrm>
+              <a:off x="9694029" y="493456"/>
+              <a:ext cx="1467429" cy="1628893"/>
+            </a:xfrm>
+            <a:prstGeom prst="rect">
+              <a:avLst/>
+            </a:prstGeom>
+          </p:spPr>
+        </p:pic>
+        <p:sp>
+          <p:nvSpPr>
+            <p:cNvPr id="128" name="TextBox 127">
+              <a:extLst>
+                <a:ext uri="{FF2B5EF4-FFF2-40B4-BE49-F238E27FC236}">
+                  <a16:creationId xmlns:a16="http://schemas.microsoft.com/office/drawing/2014/main" id="{BBB56ACB-0B57-4B44-AA08-56AADB5DE5A7}"/>
+                </a:ext>
+              </a:extLst>
+            </p:cNvPr>
+            <p:cNvSpPr txBox="1"/>
+            <p:nvPr/>
+          </p:nvSpPr>
+          <p:spPr>
+            <a:xfrm flipH="1">
+              <a:off x="9360302" y="344579"/>
+              <a:ext cx="1262745" cy="261610"/>
+            </a:xfrm>
+            <a:prstGeom prst="rect">
+              <a:avLst/>
+            </a:prstGeom>
+            <a:noFill/>
+          </p:spPr>
+          <p:txBody>
+            <a:bodyPr wrap="square" rtlCol="0">
+              <a:spAutoFit/>
+            </a:bodyPr>
+            <a:lstStyle/>
+            <a:p>
+              <a:pPr algn="ctr"/>
+              <a:r>
+                <a:rPr lang="en-US" sz="1100" b="1" i="0" dirty="0">
+                  <a:solidFill>
+                    <a:srgbClr val="444444"/>
+                  </a:solidFill>
+                  <a:effectLst/>
+                  <a:latin typeface="Lato Extended"/>
+                </a:rPr>
+                <a:t>PCA n=3</a:t>
+              </a:r>
+              <a:endParaRPr lang="en-US" sz="1100" b="1" dirty="0"/>
+            </a:p>
+          </p:txBody>
+        </p:sp>
+      </p:grpSp>
       <p:sp>
         <p:nvSpPr>
           <p:cNvPr id="129" name="TextBox 128">
@@ -5099,13 +5000,13 @@
           <p:nvPr/>
         </p:nvPicPr>
         <p:blipFill>
-          <a:blip r:embed="rId11">
+          <a:blip r:embed="rId10">
             <a:extLst>
               <a:ext uri="{28A0092B-C50C-407E-A947-70E740481C1C}">
                 <a14:useLocalDpi xmlns:a14="http://schemas.microsoft.com/office/drawing/2010/main" val="0"/>
               </a:ext>
               <a:ext uri="{96DAC541-7B7A-43D3-8B79-37D633B846F1}">
-                <asvg:svgBlip xmlns:asvg="http://schemas.microsoft.com/office/drawing/2016/SVG/main" r:embed="rId12"/>
+                <asvg:svgBlip xmlns:asvg="http://schemas.microsoft.com/office/drawing/2016/SVG/main" r:embed="rId11"/>
               </a:ext>
             </a:extLst>
           </a:blip>
@@ -5682,6 +5583,82 @@
           </a:p>
         </p:txBody>
       </p:sp>
+      <p:pic>
+        <p:nvPicPr>
+          <p:cNvPr id="12" name="Picture 11">
+            <a:extLst>
+              <a:ext uri="{FF2B5EF4-FFF2-40B4-BE49-F238E27FC236}">
+                <a16:creationId xmlns:a16="http://schemas.microsoft.com/office/drawing/2014/main" id="{6D89CB21-676C-45E0-BD79-A2365AECEFB4}"/>
+              </a:ext>
+            </a:extLst>
+          </p:cNvPr>
+          <p:cNvPicPr>
+            <a:picLocks noChangeAspect="1"/>
+          </p:cNvPicPr>
+          <p:nvPr/>
+        </p:nvPicPr>
+        <p:blipFill rotWithShape="1">
+          <a:blip r:embed="rId12">
+            <a:extLst>
+              <a:ext uri="{28A0092B-C50C-407E-A947-70E740481C1C}">
+                <a14:useLocalDpi xmlns:a14="http://schemas.microsoft.com/office/drawing/2010/main" val="0"/>
+              </a:ext>
+            </a:extLst>
+          </a:blip>
+          <a:srcRect l="6284" r="6709" b="52167"/>
+          <a:stretch/>
+        </p:blipFill>
+        <p:spPr>
+          <a:xfrm>
+            <a:off x="6263719" y="570717"/>
+            <a:ext cx="3047753" cy="1271812"/>
+          </a:xfrm>
+          <a:prstGeom prst="rect">
+            <a:avLst/>
+          </a:prstGeom>
+        </p:spPr>
+      </p:pic>
+      <p:cxnSp>
+        <p:nvCxnSpPr>
+          <p:cNvPr id="63" name="Straight Arrow Connector 62">
+            <a:extLst>
+              <a:ext uri="{FF2B5EF4-FFF2-40B4-BE49-F238E27FC236}">
+                <a16:creationId xmlns:a16="http://schemas.microsoft.com/office/drawing/2014/main" id="{B5F91664-324E-411D-8C21-9DF0021F099B}"/>
+              </a:ext>
+            </a:extLst>
+          </p:cNvPr>
+          <p:cNvCxnSpPr>
+            <a:cxnSpLocks/>
+          </p:cNvCxnSpPr>
+          <p:nvPr/>
+        </p:nvCxnSpPr>
+        <p:spPr>
+          <a:xfrm flipV="1">
+            <a:off x="9457313" y="1297031"/>
+            <a:ext cx="277643" cy="936"/>
+          </a:xfrm>
+          <a:prstGeom prst="straightConnector1">
+            <a:avLst/>
+          </a:prstGeom>
+          <a:ln>
+            <a:tailEnd type="triangle"/>
+          </a:ln>
+        </p:spPr>
+        <p:style>
+          <a:lnRef idx="1">
+            <a:schemeClr val="accent1"/>
+          </a:lnRef>
+          <a:fillRef idx="0">
+            <a:schemeClr val="accent1"/>
+          </a:fillRef>
+          <a:effectRef idx="0">
+            <a:schemeClr val="accent1"/>
+          </a:effectRef>
+          <a:fontRef idx="minor">
+            <a:schemeClr val="tx1"/>
+          </a:fontRef>
+        </p:style>
+      </p:cxnSp>
     </p:spTree>
     <p:extLst>
       <p:ext uri="{BB962C8B-B14F-4D97-AF65-F5344CB8AC3E}">

</xml_diff>